<commit_message>
Add homework solutions 2021/2022
</commit_message>
<xml_diff>
--- a/03_Seaching_Algorithms/Nasko/02_Searching_Algorithms.pptx
+++ b/03_Seaching_Algorithms/Nasko/02_Searching_Algorithms.pptx
@@ -8,6 +8,11 @@
     <p:sldId id="256" r:id="rId2"/>
     <p:sldId id="257" r:id="rId3"/>
     <p:sldId id="258" r:id="rId4"/>
+    <p:sldId id="262" r:id="rId5"/>
+    <p:sldId id="261" r:id="rId6"/>
+    <p:sldId id="259" r:id="rId7"/>
+    <p:sldId id="260" r:id="rId8"/>
+    <p:sldId id="263" r:id="rId9"/>
   </p:sldIdLst>
   <p:sldSz cx="12192000" cy="6858000"/>
   <p:notesSz cx="6858000" cy="9144000"/>
@@ -164,7 +169,7 @@
           <a:noFill/>
           <a:extLst>
             <a:ext uri="{909E8E84-426E-40dd-AFC4-6F175D3DCCD1}">
-              <a14:hiddenFill xmlns="" xmlns:a14="http://schemas.microsoft.com/office/drawing/2010/main">
+              <a14:hiddenFill xmlns:a14="http://schemas.microsoft.com/office/drawing/2010/main" xmlns="">
                 <a:solidFill>
                   <a:srgbClr val="FFFFFF"/>
                 </a:solidFill>
@@ -224,7 +229,7 @@
             </a:ln>
             <a:extLst>
               <a:ext uri="{91240B29-F687-4f45-9708-019B960494DF}">
-                <a14:hiddenLine xmlns="" xmlns:a14="http://schemas.microsoft.com/office/drawing/2010/main" w="9525">
+                <a14:hiddenLine xmlns:a14="http://schemas.microsoft.com/office/drawing/2010/main" xmlns="" w="9525">
                   <a:solidFill>
                     <a:srgbClr val="000000"/>
                   </a:solidFill>
@@ -314,7 +319,7 @@
             </a:ln>
             <a:extLst>
               <a:ext uri="{91240B29-F687-4f45-9708-019B960494DF}">
-                <a14:hiddenLine xmlns="" xmlns:a14="http://schemas.microsoft.com/office/drawing/2010/main" w="9525">
+                <a14:hiddenLine xmlns:a14="http://schemas.microsoft.com/office/drawing/2010/main" xmlns="" w="9525">
                   <a:solidFill>
                     <a:srgbClr val="000000"/>
                   </a:solidFill>
@@ -404,7 +409,7 @@
             </a:ln>
             <a:extLst>
               <a:ext uri="{91240B29-F687-4f45-9708-019B960494DF}">
-                <a14:hiddenLine xmlns="" xmlns:a14="http://schemas.microsoft.com/office/drawing/2010/main" w="9525">
+                <a14:hiddenLine xmlns:a14="http://schemas.microsoft.com/office/drawing/2010/main" xmlns="" w="9525">
                   <a:solidFill>
                     <a:srgbClr val="000000"/>
                   </a:solidFill>
@@ -438,7 +443,7 @@
             </a:ln>
             <a:extLst>
               <a:ext uri="{91240B29-F687-4f45-9708-019B960494DF}">
-                <a14:hiddenLine xmlns="" xmlns:a14="http://schemas.microsoft.com/office/drawing/2010/main" w="9525">
+                <a14:hiddenLine xmlns:a14="http://schemas.microsoft.com/office/drawing/2010/main" xmlns="" w="9525">
                   <a:solidFill>
                     <a:srgbClr val="000000"/>
                   </a:solidFill>
@@ -528,7 +533,7 @@
             </a:ln>
             <a:extLst>
               <a:ext uri="{91240B29-F687-4f45-9708-019B960494DF}">
-                <a14:hiddenLine xmlns="" xmlns:a14="http://schemas.microsoft.com/office/drawing/2010/main" w="9525">
+                <a14:hiddenLine xmlns:a14="http://schemas.microsoft.com/office/drawing/2010/main" xmlns="" w="9525">
                   <a:solidFill>
                     <a:srgbClr val="000000"/>
                   </a:solidFill>
@@ -590,7 +595,7 @@
             </a:ln>
             <a:extLst>
               <a:ext uri="{91240B29-F687-4f45-9708-019B960494DF}">
-                <a14:hiddenLine xmlns="" xmlns:a14="http://schemas.microsoft.com/office/drawing/2010/main" w="9525">
+                <a14:hiddenLine xmlns:a14="http://schemas.microsoft.com/office/drawing/2010/main" xmlns="" w="9525">
                   <a:solidFill>
                     <a:srgbClr val="000000"/>
                   </a:solidFill>
@@ -652,7 +657,7 @@
             </a:ln>
             <a:extLst>
               <a:ext uri="{91240B29-F687-4f45-9708-019B960494DF}">
-                <a14:hiddenLine xmlns="" xmlns:a14="http://schemas.microsoft.com/office/drawing/2010/main" w="9525">
+                <a14:hiddenLine xmlns:a14="http://schemas.microsoft.com/office/drawing/2010/main" xmlns="" w="9525">
                   <a:solidFill>
                     <a:srgbClr val="000000"/>
                   </a:solidFill>
@@ -742,7 +747,7 @@
             </a:ln>
             <a:extLst>
               <a:ext uri="{91240B29-F687-4f45-9708-019B960494DF}">
-                <a14:hiddenLine xmlns="" xmlns:a14="http://schemas.microsoft.com/office/drawing/2010/main" w="9525">
+                <a14:hiddenLine xmlns:a14="http://schemas.microsoft.com/office/drawing/2010/main" xmlns="" w="9525">
                   <a:solidFill>
                     <a:srgbClr val="000000"/>
                   </a:solidFill>
@@ -804,7 +809,7 @@
             </a:ln>
             <a:extLst>
               <a:ext uri="{91240B29-F687-4f45-9708-019B960494DF}">
-                <a14:hiddenLine xmlns="" xmlns:a14="http://schemas.microsoft.com/office/drawing/2010/main" w="9525">
+                <a14:hiddenLine xmlns:a14="http://schemas.microsoft.com/office/drawing/2010/main" xmlns="" w="9525">
                   <a:solidFill>
                     <a:srgbClr val="000000"/>
                   </a:solidFill>
@@ -866,7 +871,7 @@
             </a:ln>
             <a:extLst>
               <a:ext uri="{91240B29-F687-4f45-9708-019B960494DF}">
-                <a14:hiddenLine xmlns="" xmlns:a14="http://schemas.microsoft.com/office/drawing/2010/main" w="9525">
+                <a14:hiddenLine xmlns:a14="http://schemas.microsoft.com/office/drawing/2010/main" xmlns="" w="9525">
                   <a:solidFill>
                     <a:srgbClr val="000000"/>
                   </a:solidFill>
@@ -956,7 +961,7 @@
             </a:ln>
             <a:extLst>
               <a:ext uri="{91240B29-F687-4f45-9708-019B960494DF}">
-                <a14:hiddenLine xmlns="" xmlns:a14="http://schemas.microsoft.com/office/drawing/2010/main" w="9525">
+                <a14:hiddenLine xmlns:a14="http://schemas.microsoft.com/office/drawing/2010/main" xmlns="" w="9525">
                   <a:solidFill>
                     <a:srgbClr val="000000"/>
                   </a:solidFill>
@@ -1046,7 +1051,7 @@
             </a:ln>
             <a:extLst>
               <a:ext uri="{91240B29-F687-4f45-9708-019B960494DF}">
-                <a14:hiddenLine xmlns="" xmlns:a14="http://schemas.microsoft.com/office/drawing/2010/main" w="9525">
+                <a14:hiddenLine xmlns:a14="http://schemas.microsoft.com/office/drawing/2010/main" xmlns="" w="9525">
                   <a:solidFill>
                     <a:srgbClr val="000000"/>
                   </a:solidFill>
@@ -1108,7 +1113,7 @@
             </a:ln>
             <a:extLst>
               <a:ext uri="{91240B29-F687-4f45-9708-019B960494DF}">
-                <a14:hiddenLine xmlns="" xmlns:a14="http://schemas.microsoft.com/office/drawing/2010/main" w="9525">
+                <a14:hiddenLine xmlns:a14="http://schemas.microsoft.com/office/drawing/2010/main" xmlns="" w="9525">
                   <a:solidFill>
                     <a:srgbClr val="000000"/>
                   </a:solidFill>
@@ -1218,7 +1223,7 @@
             </a:ln>
             <a:extLst>
               <a:ext uri="{91240B29-F687-4f45-9708-019B960494DF}">
-                <a14:hiddenLine xmlns="" xmlns:a14="http://schemas.microsoft.com/office/drawing/2010/main" w="9525">
+                <a14:hiddenLine xmlns:a14="http://schemas.microsoft.com/office/drawing/2010/main" xmlns="" w="9525">
                   <a:solidFill>
                     <a:srgbClr val="000000"/>
                   </a:solidFill>
@@ -1280,7 +1285,7 @@
             </a:ln>
             <a:extLst>
               <a:ext uri="{91240B29-F687-4f45-9708-019B960494DF}">
-                <a14:hiddenLine xmlns="" xmlns:a14="http://schemas.microsoft.com/office/drawing/2010/main" w="9525">
+                <a14:hiddenLine xmlns:a14="http://schemas.microsoft.com/office/drawing/2010/main" xmlns="" w="9525">
                   <a:solidFill>
                     <a:srgbClr val="000000"/>
                   </a:solidFill>
@@ -1370,7 +1375,7 @@
             </a:ln>
             <a:extLst>
               <a:ext uri="{91240B29-F687-4f45-9708-019B960494DF}">
-                <a14:hiddenLine xmlns="" xmlns:a14="http://schemas.microsoft.com/office/drawing/2010/main" w="9525">
+                <a14:hiddenLine xmlns:a14="http://schemas.microsoft.com/office/drawing/2010/main" xmlns="" w="9525">
                   <a:solidFill>
                     <a:srgbClr val="000000"/>
                   </a:solidFill>
@@ -1460,7 +1465,7 @@
             </a:ln>
             <a:extLst>
               <a:ext uri="{91240B29-F687-4f45-9708-019B960494DF}">
-                <a14:hiddenLine xmlns="" xmlns:a14="http://schemas.microsoft.com/office/drawing/2010/main" w="9525">
+                <a14:hiddenLine xmlns:a14="http://schemas.microsoft.com/office/drawing/2010/main" xmlns="" w="9525">
                   <a:solidFill>
                     <a:srgbClr val="000000"/>
                   </a:solidFill>
@@ -1522,7 +1527,7 @@
             </a:ln>
             <a:extLst>
               <a:ext uri="{91240B29-F687-4f45-9708-019B960494DF}">
-                <a14:hiddenLine xmlns="" xmlns:a14="http://schemas.microsoft.com/office/drawing/2010/main" w="9525">
+                <a14:hiddenLine xmlns:a14="http://schemas.microsoft.com/office/drawing/2010/main" xmlns="" w="9525">
                   <a:solidFill>
                     <a:srgbClr val="000000"/>
                   </a:solidFill>
@@ -1612,7 +1617,7 @@
             </a:ln>
             <a:extLst>
               <a:ext uri="{91240B29-F687-4f45-9708-019B960494DF}">
-                <a14:hiddenLine xmlns="" xmlns:a14="http://schemas.microsoft.com/office/drawing/2010/main" w="9525">
+                <a14:hiddenLine xmlns:a14="http://schemas.microsoft.com/office/drawing/2010/main" xmlns="" w="9525">
                   <a:solidFill>
                     <a:srgbClr val="000000"/>
                   </a:solidFill>
@@ -1702,7 +1707,7 @@
             </a:ln>
             <a:extLst>
               <a:ext uri="{91240B29-F687-4f45-9708-019B960494DF}">
-                <a14:hiddenLine xmlns="" xmlns:a14="http://schemas.microsoft.com/office/drawing/2010/main" w="9525">
+                <a14:hiddenLine xmlns:a14="http://schemas.microsoft.com/office/drawing/2010/main" xmlns="" w="9525">
                   <a:solidFill>
                     <a:srgbClr val="000000"/>
                   </a:solidFill>
@@ -1758,7 +1763,7 @@
             </a:ln>
             <a:extLst>
               <a:ext uri="{91240B29-F687-4f45-9708-019B960494DF}">
-                <a14:hiddenLine xmlns="" xmlns:a14="http://schemas.microsoft.com/office/drawing/2010/main" w="9525">
+                <a14:hiddenLine xmlns:a14="http://schemas.microsoft.com/office/drawing/2010/main" xmlns="" w="9525">
                   <a:solidFill>
                     <a:srgbClr val="000000"/>
                   </a:solidFill>
@@ -1848,7 +1853,7 @@
             </a:ln>
             <a:extLst>
               <a:ext uri="{91240B29-F687-4f45-9708-019B960494DF}">
-                <a14:hiddenLine xmlns="" xmlns:a14="http://schemas.microsoft.com/office/drawing/2010/main" w="9525">
+                <a14:hiddenLine xmlns:a14="http://schemas.microsoft.com/office/drawing/2010/main" xmlns="" w="9525">
                   <a:solidFill>
                     <a:srgbClr val="000000"/>
                   </a:solidFill>
@@ -1904,7 +1909,7 @@
             </a:ln>
             <a:extLst>
               <a:ext uri="{91240B29-F687-4f45-9708-019B960494DF}">
-                <a14:hiddenLine xmlns="" xmlns:a14="http://schemas.microsoft.com/office/drawing/2010/main" w="9525">
+                <a14:hiddenLine xmlns:a14="http://schemas.microsoft.com/office/drawing/2010/main" xmlns="" w="9525">
                   <a:solidFill>
                     <a:srgbClr val="000000"/>
                   </a:solidFill>
@@ -1994,7 +1999,7 @@
             </a:ln>
             <a:extLst>
               <a:ext uri="{91240B29-F687-4f45-9708-019B960494DF}">
-                <a14:hiddenLine xmlns="" xmlns:a14="http://schemas.microsoft.com/office/drawing/2010/main" w="9525">
+                <a14:hiddenLine xmlns:a14="http://schemas.microsoft.com/office/drawing/2010/main" xmlns="" w="9525">
                   <a:solidFill>
                     <a:srgbClr val="000000"/>
                   </a:solidFill>
@@ -2062,7 +2067,7 @@
             </a:ln>
             <a:extLst>
               <a:ext uri="{91240B29-F687-4f45-9708-019B960494DF}">
-                <a14:hiddenLine xmlns="" xmlns:a14="http://schemas.microsoft.com/office/drawing/2010/main" w="9525">
+                <a14:hiddenLine xmlns:a14="http://schemas.microsoft.com/office/drawing/2010/main" xmlns="" w="9525">
                   <a:solidFill>
                     <a:srgbClr val="000000"/>
                   </a:solidFill>
@@ -2152,7 +2157,7 @@
             </a:ln>
             <a:extLst>
               <a:ext uri="{91240B29-F687-4f45-9708-019B960494DF}">
-                <a14:hiddenLine xmlns="" xmlns:a14="http://schemas.microsoft.com/office/drawing/2010/main" w="9525">
+                <a14:hiddenLine xmlns:a14="http://schemas.microsoft.com/office/drawing/2010/main" xmlns="" w="9525">
                   <a:solidFill>
                     <a:srgbClr val="000000"/>
                   </a:solidFill>
@@ -2220,7 +2225,7 @@
             </a:ln>
             <a:extLst>
               <a:ext uri="{91240B29-F687-4f45-9708-019B960494DF}">
-                <a14:hiddenLine xmlns="" xmlns:a14="http://schemas.microsoft.com/office/drawing/2010/main" w="9525">
+                <a14:hiddenLine xmlns:a14="http://schemas.microsoft.com/office/drawing/2010/main" xmlns="" w="9525">
                   <a:solidFill>
                     <a:srgbClr val="000000"/>
                   </a:solidFill>
@@ -2310,7 +2315,7 @@
             </a:ln>
             <a:extLst>
               <a:ext uri="{91240B29-F687-4f45-9708-019B960494DF}">
-                <a14:hiddenLine xmlns="" xmlns:a14="http://schemas.microsoft.com/office/drawing/2010/main" w="9525">
+                <a14:hiddenLine xmlns:a14="http://schemas.microsoft.com/office/drawing/2010/main" xmlns="" w="9525">
                   <a:solidFill>
                     <a:srgbClr val="000000"/>
                   </a:solidFill>
@@ -2344,7 +2349,7 @@
             </a:ln>
             <a:extLst>
               <a:ext uri="{91240B29-F687-4f45-9708-019B960494DF}">
-                <a14:hiddenLine xmlns="" xmlns:a14="http://schemas.microsoft.com/office/drawing/2010/main" w="9525">
+                <a14:hiddenLine xmlns:a14="http://schemas.microsoft.com/office/drawing/2010/main" xmlns="" w="9525">
                   <a:solidFill>
                     <a:srgbClr val="000000"/>
                   </a:solidFill>
@@ -2434,7 +2439,7 @@
             </a:ln>
             <a:extLst>
               <a:ext uri="{91240B29-F687-4f45-9708-019B960494DF}">
-                <a14:hiddenLine xmlns="" xmlns:a14="http://schemas.microsoft.com/office/drawing/2010/main" w="9525">
+                <a14:hiddenLine xmlns:a14="http://schemas.microsoft.com/office/drawing/2010/main" xmlns="" w="9525">
                   <a:solidFill>
                     <a:srgbClr val="000000"/>
                   </a:solidFill>
@@ -2496,7 +2501,7 @@
             </a:ln>
             <a:extLst>
               <a:ext uri="{91240B29-F687-4f45-9708-019B960494DF}">
-                <a14:hiddenLine xmlns="" xmlns:a14="http://schemas.microsoft.com/office/drawing/2010/main" w="9525">
+                <a14:hiddenLine xmlns:a14="http://schemas.microsoft.com/office/drawing/2010/main" xmlns="" w="9525">
                   <a:solidFill>
                     <a:srgbClr val="000000"/>
                   </a:solidFill>
@@ -2558,7 +2563,7 @@
             </a:ln>
             <a:extLst>
               <a:ext uri="{91240B29-F687-4f45-9708-019B960494DF}">
-                <a14:hiddenLine xmlns="" xmlns:a14="http://schemas.microsoft.com/office/drawing/2010/main" w="9525">
+                <a14:hiddenLine xmlns:a14="http://schemas.microsoft.com/office/drawing/2010/main" xmlns="" w="9525">
                   <a:solidFill>
                     <a:srgbClr val="000000"/>
                   </a:solidFill>
@@ -2648,7 +2653,7 @@
             </a:ln>
             <a:extLst>
               <a:ext uri="{91240B29-F687-4f45-9708-019B960494DF}">
-                <a14:hiddenLine xmlns="" xmlns:a14="http://schemas.microsoft.com/office/drawing/2010/main" w="9525">
+                <a14:hiddenLine xmlns:a14="http://schemas.microsoft.com/office/drawing/2010/main" xmlns="" w="9525">
                   <a:solidFill>
                     <a:srgbClr val="000000"/>
                   </a:solidFill>
@@ -2716,7 +2721,7 @@
             </a:ln>
             <a:extLst>
               <a:ext uri="{91240B29-F687-4f45-9708-019B960494DF}">
-                <a14:hiddenLine xmlns="" xmlns:a14="http://schemas.microsoft.com/office/drawing/2010/main" w="9525">
+                <a14:hiddenLine xmlns:a14="http://schemas.microsoft.com/office/drawing/2010/main" xmlns="" w="9525">
                   <a:solidFill>
                     <a:srgbClr val="000000"/>
                   </a:solidFill>
@@ -2778,7 +2783,7 @@
             </a:ln>
             <a:extLst>
               <a:ext uri="{91240B29-F687-4f45-9708-019B960494DF}">
-                <a14:hiddenLine xmlns="" xmlns:a14="http://schemas.microsoft.com/office/drawing/2010/main" w="9525">
+                <a14:hiddenLine xmlns:a14="http://schemas.microsoft.com/office/drawing/2010/main" xmlns="" w="9525">
                   <a:solidFill>
                     <a:srgbClr val="000000"/>
                   </a:solidFill>
@@ -2868,7 +2873,7 @@
             </a:ln>
             <a:extLst>
               <a:ext uri="{91240B29-F687-4f45-9708-019B960494DF}">
-                <a14:hiddenLine xmlns="" xmlns:a14="http://schemas.microsoft.com/office/drawing/2010/main" w="9525">
+                <a14:hiddenLine xmlns:a14="http://schemas.microsoft.com/office/drawing/2010/main" xmlns="" w="9525">
                   <a:solidFill>
                     <a:srgbClr val="000000"/>
                   </a:solidFill>
@@ -2930,7 +2935,7 @@
             </a:ln>
             <a:extLst>
               <a:ext uri="{91240B29-F687-4f45-9708-019B960494DF}">
-                <a14:hiddenLine xmlns="" xmlns:a14="http://schemas.microsoft.com/office/drawing/2010/main" w="9525">
+                <a14:hiddenLine xmlns:a14="http://schemas.microsoft.com/office/drawing/2010/main" xmlns="" w="9525">
                   <a:solidFill>
                     <a:srgbClr val="000000"/>
                   </a:solidFill>
@@ -3020,7 +3025,7 @@
             </a:ln>
             <a:extLst>
               <a:ext uri="{91240B29-F687-4f45-9708-019B960494DF}">
-                <a14:hiddenLine xmlns="" xmlns:a14="http://schemas.microsoft.com/office/drawing/2010/main" w="9525">
+                <a14:hiddenLine xmlns:a14="http://schemas.microsoft.com/office/drawing/2010/main" xmlns="" w="9525">
                   <a:solidFill>
                     <a:srgbClr val="000000"/>
                   </a:solidFill>
@@ -3082,7 +3087,7 @@
             </a:ln>
             <a:extLst>
               <a:ext uri="{91240B29-F687-4f45-9708-019B960494DF}">
-                <a14:hiddenLine xmlns="" xmlns:a14="http://schemas.microsoft.com/office/drawing/2010/main" w="9525">
+                <a14:hiddenLine xmlns:a14="http://schemas.microsoft.com/office/drawing/2010/main" xmlns="" w="9525">
                   <a:solidFill>
                     <a:srgbClr val="000000"/>
                   </a:solidFill>
@@ -3172,7 +3177,7 @@
             </a:ln>
             <a:extLst>
               <a:ext uri="{91240B29-F687-4f45-9708-019B960494DF}">
-                <a14:hiddenLine xmlns="" xmlns:a14="http://schemas.microsoft.com/office/drawing/2010/main" w="9525">
+                <a14:hiddenLine xmlns:a14="http://schemas.microsoft.com/office/drawing/2010/main" xmlns="" w="9525">
                   <a:solidFill>
                     <a:srgbClr val="000000"/>
                   </a:solidFill>
@@ -3206,7 +3211,7 @@
             </a:ln>
             <a:extLst>
               <a:ext uri="{91240B29-F687-4f45-9708-019B960494DF}">
-                <a14:hiddenLine xmlns="" xmlns:a14="http://schemas.microsoft.com/office/drawing/2010/main" w="9525">
+                <a14:hiddenLine xmlns:a14="http://schemas.microsoft.com/office/drawing/2010/main" xmlns="" w="9525">
                   <a:solidFill>
                     <a:srgbClr val="000000"/>
                   </a:solidFill>
@@ -3271,7 +3276,7 @@
             </a:ln>
             <a:extLst>
               <a:ext uri="{91240B29-F687-4f45-9708-019B960494DF}">
-                <a14:hiddenLine xmlns="" xmlns:a14="http://schemas.microsoft.com/office/drawing/2010/main" w="9525">
+                <a14:hiddenLine xmlns:a14="http://schemas.microsoft.com/office/drawing/2010/main" xmlns="" w="9525">
                   <a:solidFill>
                     <a:srgbClr val="000000"/>
                   </a:solidFill>
@@ -3361,7 +3366,7 @@
             </a:ln>
             <a:extLst>
               <a:ext uri="{91240B29-F687-4f45-9708-019B960494DF}">
-                <a14:hiddenLine xmlns="" xmlns:a14="http://schemas.microsoft.com/office/drawing/2010/main" w="9525">
+                <a14:hiddenLine xmlns:a14="http://schemas.microsoft.com/office/drawing/2010/main" xmlns="" w="9525">
                   <a:solidFill>
                     <a:srgbClr val="000000"/>
                   </a:solidFill>
@@ -3423,7 +3428,7 @@
             </a:ln>
             <a:extLst>
               <a:ext uri="{91240B29-F687-4f45-9708-019B960494DF}">
-                <a14:hiddenLine xmlns="" xmlns:a14="http://schemas.microsoft.com/office/drawing/2010/main" w="9525">
+                <a14:hiddenLine xmlns:a14="http://schemas.microsoft.com/office/drawing/2010/main" xmlns="" w="9525">
                   <a:solidFill>
                     <a:srgbClr val="000000"/>
                   </a:solidFill>
@@ -3513,7 +3518,7 @@
             </a:ln>
             <a:extLst>
               <a:ext uri="{91240B29-F687-4f45-9708-019B960494DF}">
-                <a14:hiddenLine xmlns="" xmlns:a14="http://schemas.microsoft.com/office/drawing/2010/main" w="9525">
+                <a14:hiddenLine xmlns:a14="http://schemas.microsoft.com/office/drawing/2010/main" xmlns="" w="9525">
                   <a:solidFill>
                     <a:srgbClr val="000000"/>
                   </a:solidFill>
@@ -3603,7 +3608,7 @@
             </a:ln>
             <a:extLst>
               <a:ext uri="{91240B29-F687-4f45-9708-019B960494DF}">
-                <a14:hiddenLine xmlns="" xmlns:a14="http://schemas.microsoft.com/office/drawing/2010/main" w="9525">
+                <a14:hiddenLine xmlns:a14="http://schemas.microsoft.com/office/drawing/2010/main" xmlns="" w="9525">
                   <a:solidFill>
                     <a:srgbClr val="000000"/>
                   </a:solidFill>
@@ -3668,7 +3673,7 @@
             </a:ln>
             <a:extLst>
               <a:ext uri="{91240B29-F687-4f45-9708-019B960494DF}">
-                <a14:hiddenLine xmlns="" xmlns:a14="http://schemas.microsoft.com/office/drawing/2010/main" w="9525">
+                <a14:hiddenLine xmlns:a14="http://schemas.microsoft.com/office/drawing/2010/main" xmlns="" w="9525">
                   <a:solidFill>
                     <a:srgbClr val="000000"/>
                   </a:solidFill>
@@ -3730,7 +3735,7 @@
             </a:ln>
             <a:extLst>
               <a:ext uri="{91240B29-F687-4f45-9708-019B960494DF}">
-                <a14:hiddenLine xmlns="" xmlns:a14="http://schemas.microsoft.com/office/drawing/2010/main" w="9525">
+                <a14:hiddenLine xmlns:a14="http://schemas.microsoft.com/office/drawing/2010/main" xmlns="" w="9525">
                   <a:solidFill>
                     <a:srgbClr val="000000"/>
                   </a:solidFill>
@@ -3820,7 +3825,7 @@
             </a:ln>
             <a:extLst>
               <a:ext uri="{91240B29-F687-4f45-9708-019B960494DF}">
-                <a14:hiddenLine xmlns="" xmlns:a14="http://schemas.microsoft.com/office/drawing/2010/main" w="9525">
+                <a14:hiddenLine xmlns:a14="http://schemas.microsoft.com/office/drawing/2010/main" xmlns="" w="9525">
                   <a:solidFill>
                     <a:srgbClr val="000000"/>
                   </a:solidFill>
@@ -3910,7 +3915,7 @@
             </a:ln>
             <a:extLst>
               <a:ext uri="{91240B29-F687-4f45-9708-019B960494DF}">
-                <a14:hiddenLine xmlns="" xmlns:a14="http://schemas.microsoft.com/office/drawing/2010/main" w="9525">
+                <a14:hiddenLine xmlns:a14="http://schemas.microsoft.com/office/drawing/2010/main" xmlns="" w="9525">
                   <a:solidFill>
                     <a:srgbClr val="000000"/>
                   </a:solidFill>
@@ -3972,7 +3977,7 @@
             </a:ln>
             <a:extLst>
               <a:ext uri="{91240B29-F687-4f45-9708-019B960494DF}">
-                <a14:hiddenLine xmlns="" xmlns:a14="http://schemas.microsoft.com/office/drawing/2010/main" w="9525">
+                <a14:hiddenLine xmlns:a14="http://schemas.microsoft.com/office/drawing/2010/main" xmlns="" w="9525">
                   <a:solidFill>
                     <a:srgbClr val="000000"/>
                   </a:solidFill>
@@ -4092,7 +4097,7 @@
             </a:ln>
             <a:extLst>
               <a:ext uri="{91240B29-F687-4f45-9708-019B960494DF}">
-                <a14:hiddenLine xmlns="" xmlns:a14="http://schemas.microsoft.com/office/drawing/2010/main" w="9525">
+                <a14:hiddenLine xmlns:a14="http://schemas.microsoft.com/office/drawing/2010/main" xmlns="" w="9525">
                   <a:solidFill>
                     <a:srgbClr val="000000"/>
                   </a:solidFill>
@@ -4160,7 +4165,7 @@
             </a:ln>
             <a:extLst>
               <a:ext uri="{91240B29-F687-4f45-9708-019B960494DF}">
-                <a14:hiddenLine xmlns="" xmlns:a14="http://schemas.microsoft.com/office/drawing/2010/main" w="9525">
+                <a14:hiddenLine xmlns:a14="http://schemas.microsoft.com/office/drawing/2010/main" xmlns="" w="9525">
                   <a:solidFill>
                     <a:srgbClr val="000000"/>
                   </a:solidFill>
@@ -4250,7 +4255,7 @@
             </a:ln>
             <a:extLst>
               <a:ext uri="{91240B29-F687-4f45-9708-019B960494DF}">
-                <a14:hiddenLine xmlns="" xmlns:a14="http://schemas.microsoft.com/office/drawing/2010/main" w="9525">
+                <a14:hiddenLine xmlns:a14="http://schemas.microsoft.com/office/drawing/2010/main" xmlns="" w="9525">
                   <a:solidFill>
                     <a:srgbClr val="000000"/>
                   </a:solidFill>
@@ -8972,7 +8977,7 @@
           <a:noFill/>
           <a:extLst>
             <a:ext uri="{909E8E84-426E-40dd-AFC4-6F175D3DCCD1}">
-              <a14:hiddenFill xmlns="" xmlns:a14="http://schemas.microsoft.com/office/drawing/2010/main">
+              <a14:hiddenFill xmlns:a14="http://schemas.microsoft.com/office/drawing/2010/main" xmlns="">
                 <a:solidFill>
                   <a:srgbClr val="FFFFFF"/>
                 </a:solidFill>
@@ -9046,7 +9051,7 @@
               </a:ln>
               <a:extLst>
                 <a:ext uri="{91240B29-F687-4f45-9708-019B960494DF}">
-                  <a14:hiddenLine xmlns="" xmlns:a14="http://schemas.microsoft.com/office/drawing/2010/main" w="9525">
+                  <a14:hiddenLine xmlns:a14="http://schemas.microsoft.com/office/drawing/2010/main" xmlns="" w="9525">
                     <a:solidFill>
                       <a:srgbClr val="000000"/>
                     </a:solidFill>
@@ -9136,7 +9141,7 @@
               </a:ln>
               <a:extLst>
                 <a:ext uri="{91240B29-F687-4f45-9708-019B960494DF}">
-                  <a14:hiddenLine xmlns="" xmlns:a14="http://schemas.microsoft.com/office/drawing/2010/main" w="9525">
+                  <a14:hiddenLine xmlns:a14="http://schemas.microsoft.com/office/drawing/2010/main" xmlns="" w="9525">
                     <a:solidFill>
                       <a:srgbClr val="000000"/>
                     </a:solidFill>
@@ -9226,7 +9231,7 @@
               </a:ln>
               <a:extLst>
                 <a:ext uri="{91240B29-F687-4f45-9708-019B960494DF}">
-                  <a14:hiddenLine xmlns="" xmlns:a14="http://schemas.microsoft.com/office/drawing/2010/main" w="9525">
+                  <a14:hiddenLine xmlns:a14="http://schemas.microsoft.com/office/drawing/2010/main" xmlns="" w="9525">
                     <a:solidFill>
                       <a:srgbClr val="000000"/>
                     </a:solidFill>
@@ -9288,7 +9293,7 @@
               </a:ln>
               <a:extLst>
                 <a:ext uri="{91240B29-F687-4f45-9708-019B960494DF}">
-                  <a14:hiddenLine xmlns="" xmlns:a14="http://schemas.microsoft.com/office/drawing/2010/main" w="9525">
+                  <a14:hiddenLine xmlns:a14="http://schemas.microsoft.com/office/drawing/2010/main" xmlns="" w="9525">
                     <a:solidFill>
                       <a:srgbClr val="000000"/>
                     </a:solidFill>
@@ -9378,7 +9383,7 @@
               </a:ln>
               <a:extLst>
                 <a:ext uri="{91240B29-F687-4f45-9708-019B960494DF}">
-                  <a14:hiddenLine xmlns="" xmlns:a14="http://schemas.microsoft.com/office/drawing/2010/main" w="9525">
+                  <a14:hiddenLine xmlns:a14="http://schemas.microsoft.com/office/drawing/2010/main" xmlns="" w="9525">
                     <a:solidFill>
                       <a:srgbClr val="000000"/>
                     </a:solidFill>
@@ -9440,7 +9445,7 @@
               </a:ln>
               <a:extLst>
                 <a:ext uri="{91240B29-F687-4f45-9708-019B960494DF}">
-                  <a14:hiddenLine xmlns="" xmlns:a14="http://schemas.microsoft.com/office/drawing/2010/main" w="9525">
+                  <a14:hiddenLine xmlns:a14="http://schemas.microsoft.com/office/drawing/2010/main" xmlns="" w="9525">
                     <a:solidFill>
                       <a:srgbClr val="000000"/>
                     </a:solidFill>
@@ -9502,7 +9507,7 @@
               </a:ln>
               <a:extLst>
                 <a:ext uri="{91240B29-F687-4f45-9708-019B960494DF}">
-                  <a14:hiddenLine xmlns="" xmlns:a14="http://schemas.microsoft.com/office/drawing/2010/main" w="9525">
+                  <a14:hiddenLine xmlns:a14="http://schemas.microsoft.com/office/drawing/2010/main" xmlns="" w="9525">
                     <a:solidFill>
                       <a:srgbClr val="000000"/>
                     </a:solidFill>
@@ -9592,7 +9597,7 @@
               </a:ln>
               <a:extLst>
                 <a:ext uri="{91240B29-F687-4f45-9708-019B960494DF}">
-                  <a14:hiddenLine xmlns="" xmlns:a14="http://schemas.microsoft.com/office/drawing/2010/main" w="9525">
+                  <a14:hiddenLine xmlns:a14="http://schemas.microsoft.com/office/drawing/2010/main" xmlns="" w="9525">
                     <a:solidFill>
                       <a:srgbClr val="000000"/>
                     </a:solidFill>
@@ -9682,7 +9687,7 @@
               </a:ln>
               <a:extLst>
                 <a:ext uri="{91240B29-F687-4f45-9708-019B960494DF}">
-                  <a14:hiddenLine xmlns="" xmlns:a14="http://schemas.microsoft.com/office/drawing/2010/main" w="9525">
+                  <a14:hiddenLine xmlns:a14="http://schemas.microsoft.com/office/drawing/2010/main" xmlns="" w="9525">
                     <a:solidFill>
                       <a:srgbClr val="000000"/>
                     </a:solidFill>
@@ -9744,7 +9749,7 @@
               </a:ln>
               <a:extLst>
                 <a:ext uri="{91240B29-F687-4f45-9708-019B960494DF}">
-                  <a14:hiddenLine xmlns="" xmlns:a14="http://schemas.microsoft.com/office/drawing/2010/main" w="9525">
+                  <a14:hiddenLine xmlns:a14="http://schemas.microsoft.com/office/drawing/2010/main" xmlns="" w="9525">
                     <a:solidFill>
                       <a:srgbClr val="000000"/>
                     </a:solidFill>
@@ -9854,7 +9859,7 @@
               </a:ln>
               <a:extLst>
                 <a:ext uri="{91240B29-F687-4f45-9708-019B960494DF}">
-                  <a14:hiddenLine xmlns="" xmlns:a14="http://schemas.microsoft.com/office/drawing/2010/main" w="9525">
+                  <a14:hiddenLine xmlns:a14="http://schemas.microsoft.com/office/drawing/2010/main" xmlns="" w="9525">
                     <a:solidFill>
                       <a:srgbClr val="000000"/>
                     </a:solidFill>
@@ -9938,7 +9943,7 @@
               </a:ln>
               <a:extLst>
                 <a:ext uri="{91240B29-F687-4f45-9708-019B960494DF}">
-                  <a14:hiddenLine xmlns="" xmlns:a14="http://schemas.microsoft.com/office/drawing/2010/main" w="9525">
+                  <a14:hiddenLine xmlns:a14="http://schemas.microsoft.com/office/drawing/2010/main" xmlns="" w="9525">
                     <a:solidFill>
                       <a:srgbClr val="000000"/>
                     </a:solidFill>
@@ -10000,7 +10005,7 @@
               </a:ln>
               <a:extLst>
                 <a:ext uri="{91240B29-F687-4f45-9708-019B960494DF}">
-                  <a14:hiddenLine xmlns="" xmlns:a14="http://schemas.microsoft.com/office/drawing/2010/main" w="9525">
+                  <a14:hiddenLine xmlns:a14="http://schemas.microsoft.com/office/drawing/2010/main" xmlns="" w="9525">
                     <a:solidFill>
                       <a:srgbClr val="000000"/>
                     </a:solidFill>
@@ -10062,7 +10067,7 @@
               </a:ln>
               <a:extLst>
                 <a:ext uri="{91240B29-F687-4f45-9708-019B960494DF}">
-                  <a14:hiddenLine xmlns="" xmlns:a14="http://schemas.microsoft.com/office/drawing/2010/main" w="9525">
+                  <a14:hiddenLine xmlns:a14="http://schemas.microsoft.com/office/drawing/2010/main" xmlns="" w="9525">
                     <a:solidFill>
                       <a:srgbClr val="000000"/>
                     </a:solidFill>
@@ -10152,7 +10157,7 @@
               </a:ln>
               <a:extLst>
                 <a:ext uri="{91240B29-F687-4f45-9708-019B960494DF}">
-                  <a14:hiddenLine xmlns="" xmlns:a14="http://schemas.microsoft.com/office/drawing/2010/main" w="9525">
+                  <a14:hiddenLine xmlns:a14="http://schemas.microsoft.com/office/drawing/2010/main" xmlns="" w="9525">
                     <a:solidFill>
                       <a:srgbClr val="000000"/>
                     </a:solidFill>
@@ -10186,7 +10191,7 @@
               </a:ln>
               <a:extLst>
                 <a:ext uri="{91240B29-F687-4f45-9708-019B960494DF}">
-                  <a14:hiddenLine xmlns="" xmlns:a14="http://schemas.microsoft.com/office/drawing/2010/main" w="9525">
+                  <a14:hiddenLine xmlns:a14="http://schemas.microsoft.com/office/drawing/2010/main" xmlns="" w="9525">
                     <a:solidFill>
                       <a:srgbClr val="000000"/>
                     </a:solidFill>
@@ -10251,7 +10256,7 @@
               </a:ln>
               <a:extLst>
                 <a:ext uri="{91240B29-F687-4f45-9708-019B960494DF}">
-                  <a14:hiddenLine xmlns="" xmlns:a14="http://schemas.microsoft.com/office/drawing/2010/main" w="9525">
+                  <a14:hiddenLine xmlns:a14="http://schemas.microsoft.com/office/drawing/2010/main" xmlns="" w="9525">
                     <a:solidFill>
                       <a:srgbClr val="000000"/>
                     </a:solidFill>
@@ -10341,7 +10346,7 @@
               </a:ln>
               <a:extLst>
                 <a:ext uri="{91240B29-F687-4f45-9708-019B960494DF}">
-                  <a14:hiddenLine xmlns="" xmlns:a14="http://schemas.microsoft.com/office/drawing/2010/main" w="9525">
+                  <a14:hiddenLine xmlns:a14="http://schemas.microsoft.com/office/drawing/2010/main" xmlns="" w="9525">
                     <a:solidFill>
                       <a:srgbClr val="000000"/>
                     </a:solidFill>
@@ -10403,7 +10408,7 @@
               </a:ln>
               <a:extLst>
                 <a:ext uri="{91240B29-F687-4f45-9708-019B960494DF}">
-                  <a14:hiddenLine xmlns="" xmlns:a14="http://schemas.microsoft.com/office/drawing/2010/main" w="9525">
+                  <a14:hiddenLine xmlns:a14="http://schemas.microsoft.com/office/drawing/2010/main" xmlns="" w="9525">
                     <a:solidFill>
                       <a:srgbClr val="000000"/>
                     </a:solidFill>
@@ -10493,7 +10498,7 @@
               </a:ln>
               <a:extLst>
                 <a:ext uri="{91240B29-F687-4f45-9708-019B960494DF}">
-                  <a14:hiddenLine xmlns="" xmlns:a14="http://schemas.microsoft.com/office/drawing/2010/main" w="9525">
+                  <a14:hiddenLine xmlns:a14="http://schemas.microsoft.com/office/drawing/2010/main" xmlns="" w="9525">
                     <a:solidFill>
                       <a:srgbClr val="000000"/>
                     </a:solidFill>
@@ -10558,7 +10563,7 @@
               </a:ln>
               <a:extLst>
                 <a:ext uri="{91240B29-F687-4f45-9708-019B960494DF}">
-                  <a14:hiddenLine xmlns="" xmlns:a14="http://schemas.microsoft.com/office/drawing/2010/main" w="9525">
+                  <a14:hiddenLine xmlns:a14="http://schemas.microsoft.com/office/drawing/2010/main" xmlns="" w="9525">
                     <a:solidFill>
                       <a:srgbClr val="000000"/>
                     </a:solidFill>
@@ -10620,7 +10625,7 @@
               </a:ln>
               <a:extLst>
                 <a:ext uri="{91240B29-F687-4f45-9708-019B960494DF}">
-                  <a14:hiddenLine xmlns="" xmlns:a14="http://schemas.microsoft.com/office/drawing/2010/main" w="9525">
+                  <a14:hiddenLine xmlns:a14="http://schemas.microsoft.com/office/drawing/2010/main" xmlns="" w="9525">
                     <a:solidFill>
                       <a:srgbClr val="000000"/>
                     </a:solidFill>
@@ -10710,7 +10715,7 @@
               </a:ln>
               <a:extLst>
                 <a:ext uri="{91240B29-F687-4f45-9708-019B960494DF}">
-                  <a14:hiddenLine xmlns="" xmlns:a14="http://schemas.microsoft.com/office/drawing/2010/main" w="9525">
+                  <a14:hiddenLine xmlns:a14="http://schemas.microsoft.com/office/drawing/2010/main" xmlns="" w="9525">
                     <a:solidFill>
                       <a:srgbClr val="000000"/>
                     </a:solidFill>
@@ -10800,7 +10805,7 @@
               </a:ln>
               <a:extLst>
                 <a:ext uri="{91240B29-F687-4f45-9708-019B960494DF}">
-                  <a14:hiddenLine xmlns="" xmlns:a14="http://schemas.microsoft.com/office/drawing/2010/main" w="9525">
+                  <a14:hiddenLine xmlns:a14="http://schemas.microsoft.com/office/drawing/2010/main" xmlns="" w="9525">
                     <a:solidFill>
                       <a:srgbClr val="000000"/>
                     </a:solidFill>
@@ -10865,7 +10870,7 @@
               </a:ln>
               <a:extLst>
                 <a:ext uri="{91240B29-F687-4f45-9708-019B960494DF}">
-                  <a14:hiddenLine xmlns="" xmlns:a14="http://schemas.microsoft.com/office/drawing/2010/main" w="9525">
+                  <a14:hiddenLine xmlns:a14="http://schemas.microsoft.com/office/drawing/2010/main" xmlns="" w="9525">
                     <a:solidFill>
                       <a:srgbClr val="000000"/>
                     </a:solidFill>
@@ -10985,7 +10990,7 @@
               </a:ln>
               <a:extLst>
                 <a:ext uri="{91240B29-F687-4f45-9708-019B960494DF}">
-                  <a14:hiddenLine xmlns="" xmlns:a14="http://schemas.microsoft.com/office/drawing/2010/main" w="9525">
+                  <a14:hiddenLine xmlns:a14="http://schemas.microsoft.com/office/drawing/2010/main" xmlns="" w="9525">
                     <a:solidFill>
                       <a:srgbClr val="000000"/>
                     </a:solidFill>
@@ -11083,7 +11088,7 @@
               </a:ln>
               <a:extLst>
                 <a:ext uri="{91240B29-F687-4f45-9708-019B960494DF}">
-                  <a14:hiddenLine xmlns="" xmlns:a14="http://schemas.microsoft.com/office/drawing/2010/main" w="9525">
+                  <a14:hiddenLine xmlns:a14="http://schemas.microsoft.com/office/drawing/2010/main" xmlns="" w="9525">
                     <a:solidFill>
                       <a:srgbClr val="000000"/>
                     </a:solidFill>
@@ -11198,7 +11203,7 @@
               </a:ln>
               <a:extLst>
                 <a:ext uri="{91240B29-F687-4f45-9708-019B960494DF}">
-                  <a14:hiddenLine xmlns="" xmlns:a14="http://schemas.microsoft.com/office/drawing/2010/main" w="9525">
+                  <a14:hiddenLine xmlns:a14="http://schemas.microsoft.com/office/drawing/2010/main" xmlns="" w="9525">
                     <a:solidFill>
                       <a:srgbClr val="000000"/>
                     </a:solidFill>
@@ -11288,7 +11293,7 @@
               </a:ln>
               <a:extLst>
                 <a:ext uri="{91240B29-F687-4f45-9708-019B960494DF}">
-                  <a14:hiddenLine xmlns="" xmlns:a14="http://schemas.microsoft.com/office/drawing/2010/main" w="9525">
+                  <a14:hiddenLine xmlns:a14="http://schemas.microsoft.com/office/drawing/2010/main" xmlns="" w="9525">
                     <a:solidFill>
                       <a:srgbClr val="000000"/>
                     </a:solidFill>
@@ -11353,7 +11358,7 @@
               </a:ln>
               <a:extLst>
                 <a:ext uri="{91240B29-F687-4f45-9708-019B960494DF}">
-                  <a14:hiddenLine xmlns="" xmlns:a14="http://schemas.microsoft.com/office/drawing/2010/main" w="9525">
+                  <a14:hiddenLine xmlns:a14="http://schemas.microsoft.com/office/drawing/2010/main" xmlns="" w="9525">
                     <a:solidFill>
                       <a:srgbClr val="000000"/>
                     </a:solidFill>
@@ -11443,7 +11448,7 @@
               </a:ln>
               <a:extLst>
                 <a:ext uri="{91240B29-F687-4f45-9708-019B960494DF}">
-                  <a14:hiddenLine xmlns="" xmlns:a14="http://schemas.microsoft.com/office/drawing/2010/main" w="9525">
+                  <a14:hiddenLine xmlns:a14="http://schemas.microsoft.com/office/drawing/2010/main" xmlns="" w="9525">
                     <a:solidFill>
                       <a:srgbClr val="000000"/>
                     </a:solidFill>
@@ -11511,7 +11516,7 @@
               </a:ln>
               <a:extLst>
                 <a:ext uri="{91240B29-F687-4f45-9708-019B960494DF}">
-                  <a14:hiddenLine xmlns="" xmlns:a14="http://schemas.microsoft.com/office/drawing/2010/main" w="9525">
+                  <a14:hiddenLine xmlns:a14="http://schemas.microsoft.com/office/drawing/2010/main" xmlns="" w="9525">
                     <a:solidFill>
                       <a:srgbClr val="000000"/>
                     </a:solidFill>
@@ -11601,7 +11606,7 @@
               </a:ln>
               <a:extLst>
                 <a:ext uri="{91240B29-F687-4f45-9708-019B960494DF}">
-                  <a14:hiddenLine xmlns="" xmlns:a14="http://schemas.microsoft.com/office/drawing/2010/main" w="9525">
+                  <a14:hiddenLine xmlns:a14="http://schemas.microsoft.com/office/drawing/2010/main" xmlns="" w="9525">
                     <a:solidFill>
                       <a:srgbClr val="000000"/>
                     </a:solidFill>
@@ -11669,7 +11674,7 @@
               </a:ln>
               <a:extLst>
                 <a:ext uri="{91240B29-F687-4f45-9708-019B960494DF}">
-                  <a14:hiddenLine xmlns="" xmlns:a14="http://schemas.microsoft.com/office/drawing/2010/main" w="9525">
+                  <a14:hiddenLine xmlns:a14="http://schemas.microsoft.com/office/drawing/2010/main" xmlns="" w="9525">
                     <a:solidFill>
                       <a:srgbClr val="000000"/>
                     </a:solidFill>
@@ -11759,7 +11764,7 @@
               </a:ln>
               <a:extLst>
                 <a:ext uri="{91240B29-F687-4f45-9708-019B960494DF}">
-                  <a14:hiddenLine xmlns="" xmlns:a14="http://schemas.microsoft.com/office/drawing/2010/main" w="9525">
+                  <a14:hiddenLine xmlns:a14="http://schemas.microsoft.com/office/drawing/2010/main" xmlns="" w="9525">
                     <a:solidFill>
                       <a:srgbClr val="000000"/>
                     </a:solidFill>
@@ -11793,7 +11798,7 @@
               </a:ln>
               <a:extLst>
                 <a:ext uri="{91240B29-F687-4f45-9708-019B960494DF}">
-                  <a14:hiddenLine xmlns="" xmlns:a14="http://schemas.microsoft.com/office/drawing/2010/main" w="9525">
+                  <a14:hiddenLine xmlns:a14="http://schemas.microsoft.com/office/drawing/2010/main" xmlns="" w="9525">
                     <a:solidFill>
                       <a:srgbClr val="000000"/>
                     </a:solidFill>
@@ -12609,6 +12614,540 @@
 </p:sld>
 </file>
 
+<file path=ppt/slides/slide4.xml><?xml version="1.0" encoding="utf-8"?>
+<p:sld xmlns:a="http://schemas.openxmlformats.org/drawingml/2006/main" xmlns:r="http://schemas.openxmlformats.org/officeDocument/2006/relationships" xmlns:p="http://schemas.openxmlformats.org/presentationml/2006/main">
+  <p:cSld>
+    <p:spTree>
+      <p:nvGrpSpPr>
+        <p:cNvPr id="1" name=""/>
+        <p:cNvGrpSpPr/>
+        <p:nvPr/>
+      </p:nvGrpSpPr>
+      <p:grpSpPr>
+        <a:xfrm>
+          <a:off x="0" y="0"/>
+          <a:ext cx="0" cy="0"/>
+          <a:chOff x="0" y="0"/>
+          <a:chExt cx="0" cy="0"/>
+        </a:xfrm>
+      </p:grpSpPr>
+      <p:sp>
+        <p:nvSpPr>
+          <p:cNvPr id="2" name="Title 1">
+            <a:extLst>
+              <a:ext uri="{FF2B5EF4-FFF2-40B4-BE49-F238E27FC236}">
+                <a16:creationId xmlns:a16="http://schemas.microsoft.com/office/drawing/2014/main" id="{B2D1FDC4-DCAC-6228-B53B-EB5BA60AC141}"/>
+              </a:ext>
+            </a:extLst>
+          </p:cNvPr>
+          <p:cNvSpPr>
+            <a:spLocks noGrp="1"/>
+          </p:cNvSpPr>
+          <p:nvPr>
+            <p:ph type="title"/>
+          </p:nvPr>
+        </p:nvSpPr>
+        <p:spPr/>
+        <p:txBody>
+          <a:bodyPr/>
+          <a:lstStyle/>
+          <a:p>
+            <a:r>
+              <a:rPr lang="en-US" dirty="0"/>
+              <a:t>QUIZ</a:t>
+            </a:r>
+            <a:endParaRPr lang="bg-BG" dirty="0"/>
+          </a:p>
+        </p:txBody>
+      </p:sp>
+      <p:sp>
+        <p:nvSpPr>
+          <p:cNvPr id="3" name="Content Placeholder 2">
+            <a:extLst>
+              <a:ext uri="{FF2B5EF4-FFF2-40B4-BE49-F238E27FC236}">
+                <a16:creationId xmlns:a16="http://schemas.microsoft.com/office/drawing/2014/main" id="{6288B465-7120-BA75-CD0D-6FED7F9D5BFA}"/>
+              </a:ext>
+            </a:extLst>
+          </p:cNvPr>
+          <p:cNvSpPr>
+            <a:spLocks noGrp="1"/>
+          </p:cNvSpPr>
+          <p:nvPr>
+            <p:ph idx="1"/>
+          </p:nvPr>
+        </p:nvSpPr>
+        <p:spPr/>
+        <p:txBody>
+          <a:bodyPr/>
+          <a:lstStyle/>
+          <a:p>
+            <a:pPr rtl="0">
+              <a:spcBef>
+                <a:spcPts val="0"/>
+              </a:spcBef>
+              <a:spcAft>
+                <a:spcPts val="0"/>
+              </a:spcAft>
+            </a:pPr>
+            <a:r>
+              <a:rPr lang="en-US" sz="1800" b="0" i="0" u="sng" strike="noStrike" dirty="0">
+                <a:solidFill>
+                  <a:srgbClr val="1155CC"/>
+                </a:solidFill>
+                <a:effectLst/>
+                <a:latin typeface="Arial" panose="020B0604020202020204" pitchFamily="34" charset="0"/>
+                <a:hlinkClick r:id="rId2"/>
+              </a:rPr>
+              <a:t>https://quizizz.com/admin/quiz/616f189f977e86001d9c96df/%D1%81%D1%8A%D1%87%D0%BA%D0%B8-%D1%81%D1%8A%D0%B1%D0%B8%D1%80%D0%B0%D0%BC-%D0%BF%D1%80%D1%8A%D1%87%D0%BA%D0%B8-%D0%BD%D0%B0%D0%BC%D0%B8%D1%80%D0%B0%D0%BC</a:t>
+            </a:r>
+            <a:endParaRPr lang="en-US" b="0" dirty="0">
+              <a:effectLst/>
+            </a:endParaRPr>
+          </a:p>
+          <a:p>
+            <a:pPr marL="0" indent="0">
+              <a:buNone/>
+            </a:pPr>
+            <a:br>
+              <a:rPr lang="en-US" b="0" dirty="0">
+                <a:effectLst/>
+              </a:rPr>
+            </a:br>
+            <a:endParaRPr lang="bg-BG" dirty="0"/>
+          </a:p>
+        </p:txBody>
+      </p:sp>
+    </p:spTree>
+    <p:extLst>
+      <p:ext uri="{BB962C8B-B14F-4D97-AF65-F5344CB8AC3E}">
+        <p14:creationId xmlns:p14="http://schemas.microsoft.com/office/powerpoint/2010/main" val="1964385112"/>
+      </p:ext>
+    </p:extLst>
+  </p:cSld>
+  <p:clrMapOvr>
+    <a:masterClrMapping/>
+  </p:clrMapOvr>
+</p:sld>
+</file>
+
+<file path=ppt/slides/slide5.xml><?xml version="1.0" encoding="utf-8"?>
+<p:sld xmlns:a="http://schemas.openxmlformats.org/drawingml/2006/main" xmlns:r="http://schemas.openxmlformats.org/officeDocument/2006/relationships" xmlns:p="http://schemas.openxmlformats.org/presentationml/2006/main">
+  <p:cSld>
+    <p:spTree>
+      <p:nvGrpSpPr>
+        <p:cNvPr id="1" name=""/>
+        <p:cNvGrpSpPr/>
+        <p:nvPr/>
+      </p:nvGrpSpPr>
+      <p:grpSpPr>
+        <a:xfrm>
+          <a:off x="0" y="0"/>
+          <a:ext cx="0" cy="0"/>
+          <a:chOff x="0" y="0"/>
+          <a:chExt cx="0" cy="0"/>
+        </a:xfrm>
+      </p:grpSpPr>
+      <p:sp>
+        <p:nvSpPr>
+          <p:cNvPr id="2" name="Title 1">
+            <a:extLst>
+              <a:ext uri="{FF2B5EF4-FFF2-40B4-BE49-F238E27FC236}">
+                <a16:creationId xmlns:a16="http://schemas.microsoft.com/office/drawing/2014/main" id="{E21CED45-F6D7-63D3-D109-681C58FFE67D}"/>
+              </a:ext>
+            </a:extLst>
+          </p:cNvPr>
+          <p:cNvSpPr>
+            <a:spLocks noGrp="1"/>
+          </p:cNvSpPr>
+          <p:nvPr>
+            <p:ph type="title"/>
+          </p:nvPr>
+        </p:nvSpPr>
+        <p:spPr/>
+        <p:txBody>
+          <a:bodyPr/>
+          <a:lstStyle/>
+          <a:p>
+            <a:r>
+              <a:rPr lang="en-US" dirty="0"/>
+              <a:t>Perfect printer</a:t>
+            </a:r>
+            <a:endParaRPr lang="bg-BG" dirty="0"/>
+          </a:p>
+        </p:txBody>
+      </p:sp>
+      <p:sp>
+        <p:nvSpPr>
+          <p:cNvPr id="3" name="Content Placeholder 2">
+            <a:extLst>
+              <a:ext uri="{FF2B5EF4-FFF2-40B4-BE49-F238E27FC236}">
+                <a16:creationId xmlns:a16="http://schemas.microsoft.com/office/drawing/2014/main" id="{004F7C4E-0CC5-6886-B8B8-823E31B16142}"/>
+              </a:ext>
+            </a:extLst>
+          </p:cNvPr>
+          <p:cNvSpPr>
+            <a:spLocks noGrp="1"/>
+          </p:cNvSpPr>
+          <p:nvPr>
+            <p:ph idx="1"/>
+          </p:nvPr>
+        </p:nvSpPr>
+        <p:spPr/>
+        <p:txBody>
+          <a:bodyPr/>
+          <a:lstStyle/>
+          <a:p>
+            <a:r>
+              <a:rPr lang="en-US" dirty="0">
+                <a:hlinkClick r:id="rId2"/>
+              </a:rPr>
+              <a:t>https://www.hackerrank.com/contests/sda-homework-3/challenges/challenge-2674/problem</a:t>
+            </a:r>
+            <a:endParaRPr lang="en-US" dirty="0"/>
+          </a:p>
+          <a:p>
+            <a:endParaRPr lang="bg-BG" dirty="0"/>
+          </a:p>
+        </p:txBody>
+      </p:sp>
+    </p:spTree>
+    <p:extLst>
+      <p:ext uri="{BB962C8B-B14F-4D97-AF65-F5344CB8AC3E}">
+        <p14:creationId xmlns:p14="http://schemas.microsoft.com/office/powerpoint/2010/main" val="130035661"/>
+      </p:ext>
+    </p:extLst>
+  </p:cSld>
+  <p:clrMapOvr>
+    <a:masterClrMapping/>
+  </p:clrMapOvr>
+</p:sld>
+</file>
+
+<file path=ppt/slides/slide6.xml><?xml version="1.0" encoding="utf-8"?>
+<p:sld xmlns:a="http://schemas.openxmlformats.org/drawingml/2006/main" xmlns:r="http://schemas.openxmlformats.org/officeDocument/2006/relationships" xmlns:p="http://schemas.openxmlformats.org/presentationml/2006/main">
+  <p:cSld>
+    <p:spTree>
+      <p:nvGrpSpPr>
+        <p:cNvPr id="1" name=""/>
+        <p:cNvGrpSpPr/>
+        <p:nvPr/>
+      </p:nvGrpSpPr>
+      <p:grpSpPr>
+        <a:xfrm>
+          <a:off x="0" y="0"/>
+          <a:ext cx="0" cy="0"/>
+          <a:chOff x="0" y="0"/>
+          <a:chExt cx="0" cy="0"/>
+        </a:xfrm>
+      </p:grpSpPr>
+      <p:sp>
+        <p:nvSpPr>
+          <p:cNvPr id="2" name="Title 1">
+            <a:extLst>
+              <a:ext uri="{FF2B5EF4-FFF2-40B4-BE49-F238E27FC236}">
+                <a16:creationId xmlns:a16="http://schemas.microsoft.com/office/drawing/2014/main" id="{3BA7D794-7094-6FA1-6F93-3DA0AD127122}"/>
+              </a:ext>
+            </a:extLst>
+          </p:cNvPr>
+          <p:cNvSpPr>
+            <a:spLocks noGrp="1"/>
+          </p:cNvSpPr>
+          <p:nvPr>
+            <p:ph type="title"/>
+          </p:nvPr>
+        </p:nvSpPr>
+        <p:spPr/>
+        <p:txBody>
+          <a:bodyPr/>
+          <a:lstStyle/>
+          <a:p>
+            <a:r>
+              <a:rPr lang="bg-BG" dirty="0"/>
+              <a:t>Примери и решени задачи</a:t>
+            </a:r>
+          </a:p>
+        </p:txBody>
+      </p:sp>
+      <p:sp>
+        <p:nvSpPr>
+          <p:cNvPr id="3" name="Content Placeholder 2">
+            <a:extLst>
+              <a:ext uri="{FF2B5EF4-FFF2-40B4-BE49-F238E27FC236}">
+                <a16:creationId xmlns:a16="http://schemas.microsoft.com/office/drawing/2014/main" id="{6780A9A8-FB57-BB93-452C-4448D9AFE347}"/>
+              </a:ext>
+            </a:extLst>
+          </p:cNvPr>
+          <p:cNvSpPr>
+            <a:spLocks noGrp="1"/>
+          </p:cNvSpPr>
+          <p:nvPr>
+            <p:ph idx="1"/>
+          </p:nvPr>
+        </p:nvSpPr>
+        <p:spPr/>
+        <p:txBody>
+          <a:bodyPr/>
+          <a:lstStyle/>
+          <a:p>
+            <a:r>
+              <a:rPr lang="en-US" dirty="0">
+                <a:hlinkClick r:id="rId2"/>
+              </a:rPr>
+              <a:t>https://github.com/NaskoVasilev/SDA_2022-2023/tree/main/03_Seaching_Algorithms/Nasko</a:t>
+            </a:r>
+            <a:r>
+              <a:rPr lang="bg-BG" dirty="0"/>
+              <a:t> </a:t>
+            </a:r>
+            <a:endParaRPr lang="en-US" dirty="0"/>
+          </a:p>
+          <a:p>
+            <a:r>
+              <a:rPr lang="bg-BG" dirty="0"/>
+              <a:t>Преглеждане на контролното: </a:t>
+            </a:r>
+            <a:r>
+              <a:rPr lang="en-US" dirty="0">
+                <a:hlinkClick r:id="rId3"/>
+              </a:rPr>
+              <a:t>https://learn.fmi.uni-sofia.bg/mod/quiz/review.php?attempt=169915</a:t>
+            </a:r>
+            <a:r>
+              <a:rPr lang="bg-BG" dirty="0"/>
+              <a:t> </a:t>
+            </a:r>
+          </a:p>
+        </p:txBody>
+      </p:sp>
+    </p:spTree>
+    <p:extLst>
+      <p:ext uri="{BB962C8B-B14F-4D97-AF65-F5344CB8AC3E}">
+        <p14:creationId xmlns:p14="http://schemas.microsoft.com/office/powerpoint/2010/main" val="1222865461"/>
+      </p:ext>
+    </p:extLst>
+  </p:cSld>
+  <p:clrMapOvr>
+    <a:masterClrMapping/>
+  </p:clrMapOvr>
+</p:sld>
+</file>
+
+<file path=ppt/slides/slide7.xml><?xml version="1.0" encoding="utf-8"?>
+<p:sld xmlns:a="http://schemas.openxmlformats.org/drawingml/2006/main" xmlns:r="http://schemas.openxmlformats.org/officeDocument/2006/relationships" xmlns:p="http://schemas.openxmlformats.org/presentationml/2006/main">
+  <p:cSld>
+    <p:spTree>
+      <p:nvGrpSpPr>
+        <p:cNvPr id="1" name=""/>
+        <p:cNvGrpSpPr/>
+        <p:nvPr/>
+      </p:nvGrpSpPr>
+      <p:grpSpPr>
+        <a:xfrm>
+          <a:off x="0" y="0"/>
+          <a:ext cx="0" cy="0"/>
+          <a:chOff x="0" y="0"/>
+          <a:chExt cx="0" cy="0"/>
+        </a:xfrm>
+      </p:grpSpPr>
+      <p:sp>
+        <p:nvSpPr>
+          <p:cNvPr id="2" name="Title 1">
+            <a:extLst>
+              <a:ext uri="{FF2B5EF4-FFF2-40B4-BE49-F238E27FC236}">
+                <a16:creationId xmlns:a16="http://schemas.microsoft.com/office/drawing/2014/main" id="{02073552-4941-4DCC-C76C-31ECC5604281}"/>
+              </a:ext>
+            </a:extLst>
+          </p:cNvPr>
+          <p:cNvSpPr>
+            <a:spLocks noGrp="1"/>
+          </p:cNvSpPr>
+          <p:nvPr>
+            <p:ph type="title"/>
+          </p:nvPr>
+        </p:nvSpPr>
+        <p:spPr/>
+        <p:txBody>
+          <a:bodyPr/>
+          <a:lstStyle/>
+          <a:p>
+            <a:r>
+              <a:rPr lang="bg-BG" dirty="0"/>
+              <a:t>Задачи за упражнение</a:t>
+            </a:r>
+          </a:p>
+        </p:txBody>
+      </p:sp>
+      <p:sp>
+        <p:nvSpPr>
+          <p:cNvPr id="3" name="Content Placeholder 2">
+            <a:extLst>
+              <a:ext uri="{FF2B5EF4-FFF2-40B4-BE49-F238E27FC236}">
+                <a16:creationId xmlns:a16="http://schemas.microsoft.com/office/drawing/2014/main" id="{CFBF0ABD-D196-E07A-7420-E0BFAA006E14}"/>
+              </a:ext>
+            </a:extLst>
+          </p:cNvPr>
+          <p:cNvSpPr>
+            <a:spLocks noGrp="1"/>
+          </p:cNvSpPr>
+          <p:nvPr>
+            <p:ph idx="1"/>
+          </p:nvPr>
+        </p:nvSpPr>
+        <p:spPr/>
+        <p:txBody>
+          <a:bodyPr/>
+          <a:lstStyle/>
+          <a:p>
+            <a:r>
+              <a:rPr lang="en-US" dirty="0">
+                <a:hlinkClick r:id="rId2"/>
+              </a:rPr>
+              <a:t>https://www.hackerrank.com/contests/practice-3-sda/challenges/monster-trucks</a:t>
+            </a:r>
+            <a:endParaRPr lang="bg-BG" dirty="0"/>
+          </a:p>
+          <a:p>
+            <a:r>
+              <a:rPr lang="en-US" dirty="0">
+                <a:hlinkClick r:id="rId3"/>
+              </a:rPr>
+              <a:t>https://leetcode.com/problems/find-minimum-in-rotated-sorted-array/</a:t>
+            </a:r>
+            <a:endParaRPr lang="en-US" dirty="0"/>
+          </a:p>
+          <a:p>
+            <a:r>
+              <a:rPr lang="en-US" dirty="0">
+                <a:hlinkClick r:id="rId4"/>
+              </a:rPr>
+              <a:t>https://github.com/AngelTzankov/Data-structures-and-algorithms-FMI/blob/master/Exercise%204%20-%20Searching/Problems.txt</a:t>
+            </a:r>
+            <a:endParaRPr lang="en-US" dirty="0"/>
+          </a:p>
+          <a:p>
+            <a:endParaRPr lang="bg-BG" dirty="0"/>
+          </a:p>
+          <a:p>
+            <a:endParaRPr lang="bg-BG" dirty="0"/>
+          </a:p>
+        </p:txBody>
+      </p:sp>
+    </p:spTree>
+    <p:extLst>
+      <p:ext uri="{BB962C8B-B14F-4D97-AF65-F5344CB8AC3E}">
+        <p14:creationId xmlns:p14="http://schemas.microsoft.com/office/powerpoint/2010/main" val="2145848818"/>
+      </p:ext>
+    </p:extLst>
+  </p:cSld>
+  <p:clrMapOvr>
+    <a:masterClrMapping/>
+  </p:clrMapOvr>
+</p:sld>
+</file>
+
+<file path=ppt/slides/slide8.xml><?xml version="1.0" encoding="utf-8"?>
+<p:sld xmlns:a="http://schemas.openxmlformats.org/drawingml/2006/main" xmlns:r="http://schemas.openxmlformats.org/officeDocument/2006/relationships" xmlns:p="http://schemas.openxmlformats.org/presentationml/2006/main">
+  <p:cSld>
+    <p:spTree>
+      <p:nvGrpSpPr>
+        <p:cNvPr id="1" name=""/>
+        <p:cNvGrpSpPr/>
+        <p:nvPr/>
+      </p:nvGrpSpPr>
+      <p:grpSpPr>
+        <a:xfrm>
+          <a:off x="0" y="0"/>
+          <a:ext cx="0" cy="0"/>
+          <a:chOff x="0" y="0"/>
+          <a:chExt cx="0" cy="0"/>
+        </a:xfrm>
+      </p:grpSpPr>
+      <p:sp>
+        <p:nvSpPr>
+          <p:cNvPr id="2" name="Title 1">
+            <a:extLst>
+              <a:ext uri="{FF2B5EF4-FFF2-40B4-BE49-F238E27FC236}">
+                <a16:creationId xmlns:a16="http://schemas.microsoft.com/office/drawing/2014/main" id="{4DD0BAC9-29A4-C829-3E40-45D75EA9979C}"/>
+              </a:ext>
+            </a:extLst>
+          </p:cNvPr>
+          <p:cNvSpPr>
+            <a:spLocks noGrp="1"/>
+          </p:cNvSpPr>
+          <p:nvPr>
+            <p:ph type="title"/>
+          </p:nvPr>
+        </p:nvSpPr>
+        <p:spPr/>
+        <p:txBody>
+          <a:bodyPr/>
+          <a:lstStyle/>
+          <a:p>
+            <a:r>
+              <a:rPr lang="en-US" dirty="0"/>
+              <a:t>S^3 academy</a:t>
+            </a:r>
+            <a:endParaRPr lang="bg-BG" dirty="0"/>
+          </a:p>
+        </p:txBody>
+      </p:sp>
+      <p:sp>
+        <p:nvSpPr>
+          <p:cNvPr id="3" name="Content Placeholder 2">
+            <a:extLst>
+              <a:ext uri="{FF2B5EF4-FFF2-40B4-BE49-F238E27FC236}">
+                <a16:creationId xmlns:a16="http://schemas.microsoft.com/office/drawing/2014/main" id="{FB9C03AF-BC2F-62D9-7182-2F86846097C4}"/>
+              </a:ext>
+            </a:extLst>
+          </p:cNvPr>
+          <p:cNvSpPr>
+            <a:spLocks noGrp="1"/>
+          </p:cNvSpPr>
+          <p:nvPr>
+            <p:ph idx="1"/>
+          </p:nvPr>
+        </p:nvSpPr>
+        <p:spPr/>
+        <p:txBody>
+          <a:bodyPr/>
+          <a:lstStyle/>
+          <a:p>
+            <a:r>
+              <a:rPr lang="en-US" dirty="0">
+                <a:hlinkClick r:id="rId2"/>
+              </a:rPr>
+              <a:t>https://docs.google.com/presentation/d/e/2PACX-1vTLHRr8jEUmNAFcd6Lbi8Zv5UGTBMSrlgcYFigw_Pn0gYuO-kWZ1GM2RPErSOAco1dWDV5Fv1aagQFr/pub?start=false&amp;loop=false&amp;delayms=3000&amp;slide=id.g987676a175_0_186</a:t>
+            </a:r>
+            <a:endParaRPr lang="en-US" dirty="0"/>
+          </a:p>
+          <a:p>
+            <a:r>
+              <a:rPr lang="en-US" dirty="0">
+                <a:hlinkClick r:id="rId3"/>
+              </a:rPr>
+              <a:t>https://www.youtube.com/watch?v=a3S0didkAYg&amp;ab_channel=S%5E3Team</a:t>
+            </a:r>
+            <a:r>
+              <a:rPr lang="en-US" dirty="0"/>
+              <a:t> </a:t>
+            </a:r>
+            <a:endParaRPr lang="bg-BG" dirty="0"/>
+          </a:p>
+        </p:txBody>
+      </p:sp>
+    </p:spTree>
+    <p:extLst>
+      <p:ext uri="{BB962C8B-B14F-4D97-AF65-F5344CB8AC3E}">
+        <p14:creationId xmlns:p14="http://schemas.microsoft.com/office/powerpoint/2010/main" val="3299515526"/>
+      </p:ext>
+    </p:extLst>
+  </p:cSld>
+  <p:clrMapOvr>
+    <a:masterClrMapping/>
+  </p:clrMapOvr>
+</p:sld>
+</file>
+
 <file path=ppt/theme/theme1.xml><?xml version="1.0" encoding="utf-8"?>
 <a:theme xmlns:a="http://schemas.openxmlformats.org/drawingml/2006/main" name="Circuit">
   <a:themeElements>

</xml_diff>

<commit_message>
Added Linked list resources
</commit_message>
<xml_diff>
--- a/03_Seaching_Algorithms/Nasko/02_Searching_Algorithms.pptx
+++ b/03_Seaching_Algorithms/Nasko/02_Searching_Algorithms.pptx
@@ -11,8 +11,9 @@
     <p:sldId id="262" r:id="rId5"/>
     <p:sldId id="261" r:id="rId6"/>
     <p:sldId id="259" r:id="rId7"/>
-    <p:sldId id="260" r:id="rId8"/>
-    <p:sldId id="263" r:id="rId9"/>
+    <p:sldId id="264" r:id="rId8"/>
+    <p:sldId id="260" r:id="rId9"/>
+    <p:sldId id="263" r:id="rId10"/>
   </p:sldIdLst>
   <p:sldSz cx="12192000" cy="6858000"/>
   <p:notesSz cx="6858000" cy="9144000"/>
@@ -12954,6 +12955,116 @@
           <p:cNvPr id="2" name="Title 1">
             <a:extLst>
               <a:ext uri="{FF2B5EF4-FFF2-40B4-BE49-F238E27FC236}">
+                <a16:creationId xmlns:a16="http://schemas.microsoft.com/office/drawing/2014/main" id="{CCAC2CE1-76D7-4DAE-9426-5E16322CDCF2}"/>
+              </a:ext>
+            </a:extLst>
+          </p:cNvPr>
+          <p:cNvSpPr>
+            <a:spLocks noGrp="1"/>
+          </p:cNvSpPr>
+          <p:nvPr>
+            <p:ph type="title"/>
+          </p:nvPr>
+        </p:nvSpPr>
+        <p:spPr/>
+        <p:txBody>
+          <a:bodyPr/>
+          <a:lstStyle/>
+          <a:p>
+            <a:r>
+              <a:rPr lang="en-US" dirty="0"/>
+              <a:t>Homework 2021/2022</a:t>
+            </a:r>
+            <a:endParaRPr lang="bg-BG" dirty="0"/>
+          </a:p>
+        </p:txBody>
+      </p:sp>
+      <p:sp>
+        <p:nvSpPr>
+          <p:cNvPr id="3" name="Content Placeholder 2">
+            <a:extLst>
+              <a:ext uri="{FF2B5EF4-FFF2-40B4-BE49-F238E27FC236}">
+                <a16:creationId xmlns:a16="http://schemas.microsoft.com/office/drawing/2014/main" id="{EB565949-C20E-B2BF-1E1A-691EC2D7CEA4}"/>
+              </a:ext>
+            </a:extLst>
+          </p:cNvPr>
+          <p:cNvSpPr>
+            <a:spLocks noGrp="1"/>
+          </p:cNvSpPr>
+          <p:nvPr>
+            <p:ph idx="1"/>
+          </p:nvPr>
+        </p:nvSpPr>
+        <p:spPr/>
+        <p:txBody>
+          <a:bodyPr/>
+          <a:lstStyle/>
+          <a:p>
+            <a:r>
+              <a:rPr lang="en-US" dirty="0">
+                <a:hlinkClick r:id="rId2"/>
+              </a:rPr>
+              <a:t>https://github.com/NaskoVasilev/SDA_2022-2023/tree/main/Homeworks/03_Homework</a:t>
+            </a:r>
+            <a:r>
+              <a:rPr lang="en-US" dirty="0"/>
+              <a:t> </a:t>
+            </a:r>
+          </a:p>
+          <a:p>
+            <a:r>
+              <a:rPr lang="en-US" dirty="0"/>
+              <a:t>03_Homework: </a:t>
+            </a:r>
+            <a:r>
+              <a:rPr lang="en-US" dirty="0">
+                <a:hlinkClick r:id="rId3"/>
+              </a:rPr>
+              <a:t>https://www.hackerrank.com/sda-hw-3</a:t>
+            </a:r>
+            <a:r>
+              <a:rPr lang="en-US" dirty="0"/>
+              <a:t> </a:t>
+            </a:r>
+            <a:endParaRPr lang="bg-BG" dirty="0"/>
+          </a:p>
+        </p:txBody>
+      </p:sp>
+    </p:spTree>
+    <p:extLst>
+      <p:ext uri="{BB962C8B-B14F-4D97-AF65-F5344CB8AC3E}">
+        <p14:creationId xmlns:p14="http://schemas.microsoft.com/office/powerpoint/2010/main" val="2119175791"/>
+      </p:ext>
+    </p:extLst>
+  </p:cSld>
+  <p:clrMapOvr>
+    <a:masterClrMapping/>
+  </p:clrMapOvr>
+</p:sld>
+</file>
+
+<file path=ppt/slides/slide8.xml><?xml version="1.0" encoding="utf-8"?>
+<p:sld xmlns:a="http://schemas.openxmlformats.org/drawingml/2006/main" xmlns:r="http://schemas.openxmlformats.org/officeDocument/2006/relationships" xmlns:p="http://schemas.openxmlformats.org/presentationml/2006/main">
+  <p:cSld>
+    <p:spTree>
+      <p:nvGrpSpPr>
+        <p:cNvPr id="1" name=""/>
+        <p:cNvGrpSpPr/>
+        <p:nvPr/>
+      </p:nvGrpSpPr>
+      <p:grpSpPr>
+        <a:xfrm>
+          <a:off x="0" y="0"/>
+          <a:ext cx="0" cy="0"/>
+          <a:chOff x="0" y="0"/>
+          <a:chExt cx="0" cy="0"/>
+        </a:xfrm>
+      </p:grpSpPr>
+      <p:sp>
+        <p:nvSpPr>
+          <p:cNvPr id="2" name="Title 1">
+            <a:extLst>
+              <a:ext uri="{FF2B5EF4-FFF2-40B4-BE49-F238E27FC236}">
                 <a16:creationId xmlns:a16="http://schemas.microsoft.com/office/drawing/2014/main" id="{02073552-4941-4DCC-C76C-31ECC5604281}"/>
               </a:ext>
             </a:extLst>
@@ -13045,7 +13156,7 @@
 </p:sld>
 </file>
 
-<file path=ppt/slides/slide8.xml><?xml version="1.0" encoding="utf-8"?>
+<file path=ppt/slides/slide9.xml><?xml version="1.0" encoding="utf-8"?>
 <p:sld xmlns:a="http://schemas.openxmlformats.org/drawingml/2006/main" xmlns:r="http://schemas.openxmlformats.org/officeDocument/2006/relationships" xmlns:p="http://schemas.openxmlformats.org/presentationml/2006/main">
   <p:cSld>
     <p:spTree>

</xml_diff>